<commit_message>
Update of lecture seven slides
</commit_message>
<xml_diff>
--- a/lectures/pptx/7_Lecture_seven.pptx
+++ b/lectures/pptx/7_Lecture_seven.pptx
@@ -18675,8 +18675,27 @@
                 <a:ea typeface="SimSun" panose="02010600030101010101" pitchFamily="2" charset="-122"/>
                 <a:cs typeface="Courier New" panose="02070309020205020404" pitchFamily="49" charset="0"/>
               </a:rPr>
-              <a:t>] = f + 1.0f;</a:t>
-            </a:r>
+              <a:t>] = f + </a:t>
+            </a:r>
+            <a:r>
+              <a:rPr lang="pt-BR" sz="1000" b="1" dirty="0" smtClean="0">
+                <a:solidFill>
+                  <a:srgbClr val="000000"/>
+                </a:solidFill>
+                <a:latin typeface="Courier New" panose="02070309020205020404" pitchFamily="49" charset="0"/>
+                <a:ea typeface="SimSun" panose="02010600030101010101" pitchFamily="2" charset="-122"/>
+                <a:cs typeface="Courier New" panose="02070309020205020404" pitchFamily="49" charset="0"/>
+              </a:rPr>
+              <a:t>1.0;</a:t>
+            </a:r>
+            <a:endParaRPr lang="pt-BR" sz="1000" b="1" dirty="0">
+              <a:solidFill>
+                <a:srgbClr val="000000"/>
+              </a:solidFill>
+              <a:latin typeface="Courier New" panose="02070309020205020404" pitchFamily="49" charset="0"/>
+              <a:ea typeface="SimSun" panose="02010600030101010101" pitchFamily="2" charset="-122"/>
+              <a:cs typeface="Courier New" panose="02070309020205020404" pitchFamily="49" charset="0"/>
+            </a:endParaRPr>
           </a:p>
           <a:p>
             <a:r>
@@ -18699,8 +18718,27 @@
                 <a:ea typeface="SimSun" panose="02010600030101010101" pitchFamily="2" charset="-122"/>
                 <a:cs typeface="Courier New" panose="02070309020205020404" pitchFamily="49" charset="0"/>
               </a:rPr>
-              <a:t>] = f + 1.0f;</a:t>
-            </a:r>
+              <a:t>] = f + </a:t>
+            </a:r>
+            <a:r>
+              <a:rPr lang="pt-BR" sz="1000" b="1" dirty="0" smtClean="0">
+                <a:solidFill>
+                  <a:srgbClr val="000000"/>
+                </a:solidFill>
+                <a:latin typeface="Courier New" panose="02070309020205020404" pitchFamily="49" charset="0"/>
+                <a:ea typeface="SimSun" panose="02010600030101010101" pitchFamily="2" charset="-122"/>
+                <a:cs typeface="Courier New" panose="02070309020205020404" pitchFamily="49" charset="0"/>
+              </a:rPr>
+              <a:t>1.0;</a:t>
+            </a:r>
+            <a:endParaRPr lang="pt-BR" sz="1000" b="1" dirty="0">
+              <a:solidFill>
+                <a:srgbClr val="000000"/>
+              </a:solidFill>
+              <a:latin typeface="Courier New" panose="02070309020205020404" pitchFamily="49" charset="0"/>
+              <a:ea typeface="SimSun" panose="02010600030101010101" pitchFamily="2" charset="-122"/>
+              <a:cs typeface="Courier New" panose="02070309020205020404" pitchFamily="49" charset="0"/>
+            </a:endParaRPr>
           </a:p>
           <a:p>
             <a:r>
@@ -19368,7 +19406,7 @@
         <p:spPr>
           <a:xfrm>
             <a:off x="4716016" y="1720552"/>
-            <a:ext cx="4032448" cy="3477875"/>
+            <a:ext cx="4032448" cy="3323987"/>
           </a:xfrm>
           <a:prstGeom prst="rect">
             <a:avLst/>
@@ -19999,82 +20037,6 @@
             </a:r>
             <a:r>
               <a:rPr lang="pt-BR" sz="1000" b="1" dirty="0" smtClean="0">
-                <a:solidFill>
-                  <a:srgbClr val="000000"/>
-                </a:solidFill>
-                <a:latin typeface="Courier New" panose="02070309020205020404" pitchFamily="49" charset="0"/>
-                <a:ea typeface="SimSun" panose="02010600030101010101" pitchFamily="2" charset="-122"/>
-                <a:cs typeface="Courier New" panose="02070309020205020404" pitchFamily="49" charset="0"/>
-              </a:rPr>
-              <a:t>));</a:t>
-            </a:r>
-            <a:endParaRPr lang="pt-BR" sz="1000" b="1" dirty="0">
-              <a:solidFill>
-                <a:srgbClr val="000000"/>
-              </a:solidFill>
-              <a:latin typeface="Courier New" panose="02070309020205020404" pitchFamily="49" charset="0"/>
-              <a:ea typeface="SimSun" panose="02010600030101010101" pitchFamily="2" charset="-122"/>
-              <a:cs typeface="Courier New" panose="02070309020205020404" pitchFamily="49" charset="0"/>
-            </a:endParaRPr>
-          </a:p>
-          <a:p>
-            <a:r>
-              <a:rPr lang="pt-BR" sz="1000" b="1" dirty="0" smtClean="0">
-                <a:solidFill>
-                  <a:srgbClr val="000000"/>
-                </a:solidFill>
-                <a:latin typeface="Courier New" panose="02070309020205020404" pitchFamily="49" charset="0"/>
-                <a:ea typeface="SimSun" panose="02010600030101010101" pitchFamily="2" charset="-122"/>
-                <a:cs typeface="Courier New" panose="02070309020205020404" pitchFamily="49" charset="0"/>
-              </a:rPr>
-              <a:t>  cudaMemset(d_C</a:t>
-            </a:r>
-            <a:r>
-              <a:rPr lang="pt-BR" sz="1000" b="1" dirty="0">
-                <a:solidFill>
-                  <a:srgbClr val="000000"/>
-                </a:solidFill>
-                <a:latin typeface="Courier New" panose="02070309020205020404" pitchFamily="49" charset="0"/>
-                <a:ea typeface="SimSun" panose="02010600030101010101" pitchFamily="2" charset="-122"/>
-                <a:cs typeface="Courier New" panose="02070309020205020404" pitchFamily="49" charset="0"/>
-              </a:rPr>
-              <a:t>, 0, N*</a:t>
-            </a:r>
-            <a:r>
-              <a:rPr lang="pt-BR" sz="1000" b="1" dirty="0">
-                <a:solidFill>
-                  <a:srgbClr val="0000FF"/>
-                </a:solidFill>
-                <a:latin typeface="Courier New" panose="02070309020205020404" pitchFamily="49" charset="0"/>
-                <a:ea typeface="SimSun" panose="02010600030101010101" pitchFamily="2" charset="-122"/>
-                <a:cs typeface="Courier New" panose="02070309020205020404" pitchFamily="49" charset="0"/>
-              </a:rPr>
-              <a:t>sizeof</a:t>
-            </a:r>
-            <a:r>
-              <a:rPr lang="pt-BR" sz="1000" b="1" dirty="0">
-                <a:solidFill>
-                  <a:srgbClr val="000000"/>
-                </a:solidFill>
-                <a:latin typeface="Courier New" panose="02070309020205020404" pitchFamily="49" charset="0"/>
-                <a:ea typeface="SimSun" panose="02010600030101010101" pitchFamily="2" charset="-122"/>
-                <a:cs typeface="Courier New" panose="02070309020205020404" pitchFamily="49" charset="0"/>
-              </a:rPr>
-              <a:t>(</a:t>
-            </a:r>
-            <a:r>
-              <a:rPr lang="pt-BR" sz="1000" b="1" dirty="0">
-                <a:solidFill>
-                  <a:srgbClr val="66CCFF"/>
-                </a:solidFill>
-                <a:latin typeface="Courier New" panose="02070309020205020404" pitchFamily="49" charset="0"/>
-                <a:ea typeface="SimSun" panose="02010600030101010101" pitchFamily="2" charset="-122"/>
-                <a:cs typeface="Courier New" panose="02070309020205020404" pitchFamily="49" charset="0"/>
-              </a:rPr>
-              <a:t>float</a:t>
-            </a:r>
-            <a:r>
-              <a:rPr lang="pt-BR" sz="1000" b="1" dirty="0">
                 <a:solidFill>
                   <a:srgbClr val="000000"/>
                 </a:solidFill>
@@ -25627,7 +25589,7 @@
           </p:cNvPicPr>
           <p:nvPr/>
         </p:nvPicPr>
-        <p:blipFill rotWithShape="1">
+        <p:blipFill>
           <a:blip r:embed="rId3">
             <a:extLst>
               <a:ext uri="{28A0092B-C50C-407E-A947-70E740481C1C}">
@@ -25635,13 +25597,14 @@
               </a:ext>
             </a:extLst>
           </a:blip>
-          <a:srcRect b="3334"/>
-          <a:stretch/>
+          <a:stretch>
+            <a:fillRect/>
+          </a:stretch>
         </p:blipFill>
         <p:spPr>
           <a:xfrm>
             <a:off x="4258220" y="1603077"/>
-            <a:ext cx="4343400" cy="745803"/>
+            <a:ext cx="4343400" cy="771525"/>
           </a:xfrm>
           <a:prstGeom prst="rect">
             <a:avLst/>
@@ -26851,6 +26814,193 @@
                 <a:schemeClr val="bg1"/>
               </a:solidFill>
               <a:latin typeface="Arial" panose="020B0604020202020204" pitchFamily="34" charset="0"/>
+            </a:endParaRPr>
+          </a:p>
+        </p:txBody>
+      </p:sp>
+      <p:sp>
+        <p:nvSpPr>
+          <p:cNvPr id="3" name="TextBox 2"/>
+          <p:cNvSpPr txBox="1"/>
+          <p:nvPr/>
+        </p:nvSpPr>
+        <p:spPr>
+          <a:xfrm>
+            <a:off x="467544" y="2472889"/>
+            <a:ext cx="3888432" cy="2308324"/>
+          </a:xfrm>
+          <a:prstGeom prst="rect">
+            <a:avLst/>
+          </a:prstGeom>
+          <a:noFill/>
+        </p:spPr>
+        <p:txBody>
+          <a:bodyPr wrap="square" rtlCol="0">
+            <a:spAutoFit/>
+          </a:bodyPr>
+          <a:lstStyle/>
+          <a:p>
+            <a:r>
+              <a:rPr lang="en-US" sz="1600" dirty="0" smtClean="0">
+                <a:latin typeface="+mn-lt"/>
+              </a:rPr>
+              <a:t>On NVIDIA GTX 1080 for N=67 M points</a:t>
+            </a:r>
+          </a:p>
+          <a:p>
+            <a:endParaRPr lang="en-US" sz="1600" dirty="0">
+              <a:latin typeface="+mn-lt"/>
+              <a:cs typeface="Courier New" panose="02070309020205020404" pitchFamily="49" charset="0"/>
+            </a:endParaRPr>
+          </a:p>
+          <a:p>
+            <a:r>
+              <a:rPr lang="en-US" sz="1600" dirty="0" err="1" smtClean="0">
+                <a:latin typeface="+mn-lt"/>
+                <a:cs typeface="Courier New" panose="02070309020205020404" pitchFamily="49" charset="0"/>
+              </a:rPr>
+              <a:t>Uncoalesced</a:t>
+            </a:r>
+            <a:r>
+              <a:rPr lang="en-US" sz="1600" dirty="0" smtClean="0">
+                <a:latin typeface="+mn-lt"/>
+                <a:cs typeface="Courier New" panose="02070309020205020404" pitchFamily="49" charset="0"/>
+              </a:rPr>
+              <a:t> memory access execution time: 28.77 </a:t>
+            </a:r>
+            <a:r>
+              <a:rPr lang="en-US" sz="1600" dirty="0" err="1" smtClean="0">
+                <a:latin typeface="+mn-lt"/>
+                <a:cs typeface="Courier New" panose="02070309020205020404" pitchFamily="49" charset="0"/>
+              </a:rPr>
+              <a:t>ms</a:t>
+            </a:r>
+            <a:endParaRPr lang="en-US" sz="1600" dirty="0" smtClean="0">
+              <a:latin typeface="+mn-lt"/>
+              <a:cs typeface="Courier New" panose="02070309020205020404" pitchFamily="49" charset="0"/>
+            </a:endParaRPr>
+          </a:p>
+          <a:p>
+            <a:endParaRPr lang="en-US" sz="1600" dirty="0">
+              <a:latin typeface="+mn-lt"/>
+              <a:cs typeface="Courier New" panose="02070309020205020404" pitchFamily="49" charset="0"/>
+            </a:endParaRPr>
+          </a:p>
+          <a:p>
+            <a:r>
+              <a:rPr lang="en-US" sz="1600" dirty="0" smtClean="0">
+                <a:latin typeface="+mn-lt"/>
+                <a:cs typeface="Courier New" panose="02070309020205020404" pitchFamily="49" charset="0"/>
+              </a:rPr>
+              <a:t>Coalesced memory access execution time: 2.29 </a:t>
+            </a:r>
+            <a:r>
+              <a:rPr lang="en-US" sz="1600" dirty="0" err="1" smtClean="0">
+                <a:latin typeface="+mn-lt"/>
+                <a:cs typeface="Courier New" panose="02070309020205020404" pitchFamily="49" charset="0"/>
+              </a:rPr>
+              <a:t>ms</a:t>
+            </a:r>
+            <a:endParaRPr lang="en-US" sz="1600" dirty="0" smtClean="0">
+              <a:latin typeface="+mn-lt"/>
+              <a:cs typeface="Courier New" panose="02070309020205020404" pitchFamily="49" charset="0"/>
+            </a:endParaRPr>
+          </a:p>
+          <a:p>
+            <a:endParaRPr lang="en-US" sz="1600" dirty="0">
+              <a:latin typeface="+mn-lt"/>
+              <a:cs typeface="Courier New" panose="02070309020205020404" pitchFamily="49" charset="0"/>
+            </a:endParaRPr>
+          </a:p>
+          <a:p>
+            <a:r>
+              <a:rPr lang="en-US" sz="1600" dirty="0" smtClean="0">
+                <a:latin typeface="+mn-lt"/>
+                <a:cs typeface="Courier New" panose="02070309020205020404" pitchFamily="49" charset="0"/>
+              </a:rPr>
+              <a:t>Speed up </a:t>
+            </a:r>
+            <a:r>
+              <a:rPr lang="en-US" sz="1600" b="1" dirty="0" smtClean="0">
+                <a:latin typeface="+mn-lt"/>
+                <a:cs typeface="Courier New" panose="02070309020205020404" pitchFamily="49" charset="0"/>
+              </a:rPr>
+              <a:t>12x</a:t>
+            </a:r>
+            <a:endParaRPr lang="en-US" sz="1600" b="1" dirty="0" smtClean="0">
+              <a:latin typeface="+mn-lt"/>
+              <a:cs typeface="Courier New" panose="02070309020205020404" pitchFamily="49" charset="0"/>
+            </a:endParaRPr>
+          </a:p>
+        </p:txBody>
+      </p:sp>
+      <p:pic>
+        <p:nvPicPr>
+          <p:cNvPr id="2" name="Picture 1"/>
+          <p:cNvPicPr>
+            <a:picLocks noChangeAspect="1"/>
+          </p:cNvPicPr>
+          <p:nvPr/>
+        </p:nvPicPr>
+        <p:blipFill>
+          <a:blip r:embed="rId3">
+            <a:extLst>
+              <a:ext uri="{28A0092B-C50C-407E-A947-70E740481C1C}">
+                <a14:useLocalDpi xmlns:a14="http://schemas.microsoft.com/office/drawing/2010/main" val="0"/>
+              </a:ext>
+            </a:extLst>
+          </a:blip>
+          <a:stretch>
+            <a:fillRect/>
+          </a:stretch>
+        </p:blipFill>
+        <p:spPr>
+          <a:xfrm>
+            <a:off x="4716016" y="1700808"/>
+            <a:ext cx="4176464" cy="2148176"/>
+          </a:xfrm>
+          <a:prstGeom prst="rect">
+            <a:avLst/>
+          </a:prstGeom>
+        </p:spPr>
+      </p:pic>
+      <p:sp>
+        <p:nvSpPr>
+          <p:cNvPr id="5" name="TextBox 4"/>
+          <p:cNvSpPr txBox="1"/>
+          <p:nvPr/>
+        </p:nvSpPr>
+        <p:spPr>
+          <a:xfrm>
+            <a:off x="5016733" y="4365104"/>
+            <a:ext cx="3888432" cy="1569660"/>
+          </a:xfrm>
+          <a:prstGeom prst="rect">
+            <a:avLst/>
+          </a:prstGeom>
+          <a:noFill/>
+        </p:spPr>
+        <p:txBody>
+          <a:bodyPr wrap="square" rtlCol="0">
+            <a:spAutoFit/>
+          </a:bodyPr>
+          <a:lstStyle/>
+          <a:p>
+            <a:r>
+              <a:rPr lang="en-US" sz="1600" dirty="0" smtClean="0">
+                <a:latin typeface="+mn-lt"/>
+              </a:rPr>
+              <a:t>Data are read from memory in blocks of 128 bytes (32 floats), even if we request one value all others are delivered anyway. Coalesced memory access is better because it uses these ‘free</a:t>
+            </a:r>
+            <a:r>
+              <a:rPr lang="en-US" sz="1600" smtClean="0">
+                <a:latin typeface="+mn-lt"/>
+              </a:rPr>
+              <a:t>’ values.</a:t>
+            </a:r>
+            <a:endParaRPr lang="en-US" sz="1600" b="1" dirty="0" smtClean="0">
+              <a:latin typeface="+mn-lt"/>
+              <a:cs typeface="Courier New" panose="02070309020205020404" pitchFamily="49" charset="0"/>
             </a:endParaRPr>
           </a:p>
         </p:txBody>
@@ -27313,8 +27463,8 @@
         </p:nvSpPr>
         <p:spPr>
           <a:xfrm>
-            <a:off x="1619672" y="2204864"/>
-            <a:ext cx="5904656" cy="2462213"/>
+            <a:off x="2663788" y="2420888"/>
+            <a:ext cx="3816424" cy="2677656"/>
           </a:xfrm>
           <a:prstGeom prst="rect">
             <a:avLst/>
@@ -27335,13 +27485,7 @@
               <a:rPr lang="en-US" sz="1400" dirty="0" smtClean="0">
                 <a:latin typeface="+mn-lt"/>
               </a:rPr>
-              <a:t>How to write a basic code with GPU kernels</a:t>
-            </a:r>
-            <a:r>
-              <a:rPr lang="en-US" sz="1400" dirty="0" smtClean="0">
-                <a:latin typeface="+mn-lt"/>
-              </a:rPr>
-              <a:t>.</a:t>
+              <a:t>How to write a basic code with GPU kernels.</a:t>
             </a:r>
           </a:p>
           <a:p>
@@ -27349,9 +27493,12 @@
               <a:buFont typeface="Arial" panose="020B0604020202020204" pitchFamily="34" charset="0"/>
               <a:buChar char="•"/>
             </a:pPr>
-            <a:endParaRPr lang="en-US" sz="1400" dirty="0" smtClean="0">
-              <a:latin typeface="+mn-lt"/>
-            </a:endParaRPr>
+            <a:r>
+              <a:rPr lang="en-US" sz="1400" dirty="0" smtClean="0">
+                <a:latin typeface="+mn-lt"/>
+              </a:rPr>
+              <a:t>Basics of how to use Unified memory or manage memory ourselves.</a:t>
+            </a:r>
           </a:p>
           <a:p>
             <a:pPr marL="285750" indent="-285750">
@@ -27362,13 +27509,7 @@
               <a:rPr lang="en-US" sz="1400" dirty="0" smtClean="0">
                 <a:latin typeface="+mn-lt"/>
               </a:rPr>
-              <a:t>Basics of how to use Unified memory or manage memory ourselves</a:t>
-            </a:r>
-            <a:r>
-              <a:rPr lang="en-US" sz="1400" dirty="0" smtClean="0">
-                <a:latin typeface="+mn-lt"/>
-              </a:rPr>
-              <a:t>.</a:t>
+              <a:t>How to launch kernels using blocks and threads.</a:t>
             </a:r>
           </a:p>
           <a:p>
@@ -27376,63 +27517,12 @@
               <a:buFont typeface="Arial" panose="020B0604020202020204" pitchFamily="34" charset="0"/>
               <a:buChar char="•"/>
             </a:pPr>
-            <a:endParaRPr lang="en-US" sz="1400" dirty="0" smtClean="0">
-              <a:latin typeface="+mn-lt"/>
-            </a:endParaRPr>
-          </a:p>
-          <a:p>
-            <a:pPr marL="285750" indent="-285750">
-              <a:buFont typeface="Arial" panose="020B0604020202020204" pitchFamily="34" charset="0"/>
-              <a:buChar char="•"/>
-            </a:pPr>
             <a:r>
               <a:rPr lang="en-US" sz="1400" dirty="0" smtClean="0">
                 <a:latin typeface="+mn-lt"/>
               </a:rPr>
-              <a:t>How to launch kernels using blocks and threads</a:t>
-            </a:r>
-            <a:r>
-              <a:rPr lang="en-US" sz="1400" dirty="0" smtClean="0">
-                <a:latin typeface="+mn-lt"/>
-              </a:rPr>
-              <a:t>.</a:t>
-            </a:r>
-          </a:p>
-          <a:p>
-            <a:pPr marL="285750" indent="-285750">
-              <a:buFont typeface="Arial" panose="020B0604020202020204" pitchFamily="34" charset="0"/>
-              <a:buChar char="•"/>
-            </a:pPr>
-            <a:endParaRPr lang="en-US" sz="1400" dirty="0" smtClean="0">
-              <a:latin typeface="+mn-lt"/>
-            </a:endParaRPr>
-          </a:p>
-          <a:p>
-            <a:pPr marL="285750" indent="-285750">
-              <a:buFont typeface="Arial" panose="020B0604020202020204" pitchFamily="34" charset="0"/>
-              <a:buChar char="•"/>
-            </a:pPr>
-            <a:r>
-              <a:rPr lang="en-US" sz="1400" dirty="0" smtClean="0">
-                <a:latin typeface="+mn-lt"/>
-              </a:rPr>
-              <a:t>Basics of how to use blocks and threads ids to map data to threads</a:t>
-            </a:r>
-            <a:r>
-              <a:rPr lang="en-US" sz="1400" dirty="0" smtClean="0">
-                <a:latin typeface="+mn-lt"/>
-              </a:rPr>
-              <a:t>.</a:t>
-            </a:r>
-          </a:p>
-          <a:p>
-            <a:pPr marL="285750" indent="-285750">
-              <a:buFont typeface="Arial" panose="020B0604020202020204" pitchFamily="34" charset="0"/>
-              <a:buChar char="•"/>
-            </a:pPr>
-            <a:endParaRPr lang="en-US" sz="1400" dirty="0" smtClean="0">
-              <a:latin typeface="+mn-lt"/>
-            </a:endParaRPr>
+              <a:t>Basics of how to use blocks and threads ids to map data to threads.</a:t>
+            </a:r>
           </a:p>
           <a:p>
             <a:pPr marL="285750" indent="-285750">
@@ -38446,15 +38536,6 @@
 </file>
 
 <file path=customXml/item1.xml><?xml version="1.0" encoding="utf-8"?>
-<p:properties xmlns:p="http://schemas.microsoft.com/office/2006/metadata/properties" xmlns:xsi="http://www.w3.org/2001/XMLSchema-instance" xmlns:pc="http://schemas.microsoft.com/office/infopath/2007/PartnerControls">
-  <documentManagement>
-    <PublishingExpirationDate xmlns="http://schemas.microsoft.com/sharepoint/v3" xsi:nil="true"/>
-    <PublishingStartDate xmlns="http://schemas.microsoft.com/sharepoint/v3" xsi:nil="true"/>
-  </documentManagement>
-</p:properties>
-</file>
-
-<file path=customXml/item2.xml><?xml version="1.0" encoding="utf-8"?>
 <ct:contentTypeSchema xmlns:ct="http://schemas.microsoft.com/office/2006/metadata/contentType" xmlns:ma="http://schemas.microsoft.com/office/2006/metadata/properties/metaAttributes" ct:_="" ma:_="" ma:contentTypeName="Document" ma:contentTypeID="0x010100F087B862386F8A48840A2142C0600765" ma:contentTypeVersion="1" ma:contentTypeDescription="Create a new document." ma:contentTypeScope="" ma:versionID="68e7a6ad2ab34d836eda56dc5c7bc733">
   <xsd:schema xmlns:xsd="http://www.w3.org/2001/XMLSchema" xmlns:xs="http://www.w3.org/2001/XMLSchema" xmlns:p="http://schemas.microsoft.com/office/2006/metadata/properties" xmlns:ns1="http://schemas.microsoft.com/sharepoint/v3" targetNamespace="http://schemas.microsoft.com/office/2006/metadata/properties" ma:root="true" ma:fieldsID="48c5b5cd9b8d25ff6dd15848836f4270" ns1:_="">
     <xsd:import namespace="http://schemas.microsoft.com/sharepoint/v3"/>
@@ -38586,7 +38667,7 @@
 </ct:contentTypeSchema>
 </file>
 
-<file path=customXml/item3.xml><?xml version="1.0" encoding="utf-8"?>
+<file path=customXml/item2.xml><?xml version="1.0" encoding="utf-8"?>
 <?mso-contentType ?>
 <FormTemplates xmlns="http://schemas.microsoft.com/sharepoint/v3/contenttype/forms">
   <Display>DocumentLibraryForm</Display>
@@ -38595,23 +38676,16 @@
 </FormTemplates>
 </file>
 
-<file path=customXml/itemProps1.xml><?xml version="1.0" encoding="utf-8"?>
-<ds:datastoreItem xmlns:ds="http://schemas.openxmlformats.org/officeDocument/2006/customXml" ds:itemID="{D83787E9-855B-43BD-8382-B7C63B9BC33D}">
-  <ds:schemaRefs>
-    <ds:schemaRef ds:uri="http://schemas.microsoft.com/office/2006/metadata/properties"/>
-    <ds:schemaRef ds:uri="http://purl.org/dc/terms/"/>
-    <ds:schemaRef ds:uri="http://purl.org/dc/elements/1.1/"/>
-    <ds:schemaRef ds:uri="http://purl.org/dc/dcmitype/"/>
-    <ds:schemaRef ds:uri="http://schemas.microsoft.com/office/2006/documentManagement/types"/>
-    <ds:schemaRef ds:uri="http://schemas.openxmlformats.org/package/2006/metadata/core-properties"/>
-    <ds:schemaRef ds:uri="http://schemas.microsoft.com/office/infopath/2007/PartnerControls"/>
-    <ds:schemaRef ds:uri="http://schemas.microsoft.com/sharepoint/v3"/>
-    <ds:schemaRef ds:uri="http://www.w3.org/XML/1998/namespace"/>
-  </ds:schemaRefs>
-</ds:datastoreItem>
+<file path=customXml/item3.xml><?xml version="1.0" encoding="utf-8"?>
+<p:properties xmlns:p="http://schemas.microsoft.com/office/2006/metadata/properties" xmlns:xsi="http://www.w3.org/2001/XMLSchema-instance" xmlns:pc="http://schemas.microsoft.com/office/infopath/2007/PartnerControls">
+  <documentManagement>
+    <PublishingExpirationDate xmlns="http://schemas.microsoft.com/sharepoint/v3" xsi:nil="true"/>
+    <PublishingStartDate xmlns="http://schemas.microsoft.com/sharepoint/v3" xsi:nil="true"/>
+  </documentManagement>
+</p:properties>
 </file>
 
-<file path=customXml/itemProps2.xml><?xml version="1.0" encoding="utf-8"?>
+<file path=customXml/itemProps1.xml><?xml version="1.0" encoding="utf-8"?>
 <ds:datastoreItem xmlns:ds="http://schemas.openxmlformats.org/officeDocument/2006/customXml" ds:itemID="{866DD9C6-787C-4079-86E8-1446954686C6}">
   <ds:schemaRefs>
     <ds:schemaRef ds:uri="http://schemas.microsoft.com/office/2006/metadata/contentType"/>
@@ -38629,10 +38703,26 @@
 </ds:datastoreItem>
 </file>
 
-<file path=customXml/itemProps3.xml><?xml version="1.0" encoding="utf-8"?>
+<file path=customXml/itemProps2.xml><?xml version="1.0" encoding="utf-8"?>
 <ds:datastoreItem xmlns:ds="http://schemas.openxmlformats.org/officeDocument/2006/customXml" ds:itemID="{2E0637EC-CEA5-409F-B139-003005A14145}">
   <ds:schemaRefs>
     <ds:schemaRef ds:uri="http://schemas.microsoft.com/sharepoint/v3/contenttype/forms"/>
   </ds:schemaRefs>
 </ds:datastoreItem>
+</file>
+
+<file path=customXml/itemProps3.xml><?xml version="1.0" encoding="utf-8"?>
+<ds:datastoreItem xmlns:ds="http://schemas.openxmlformats.org/officeDocument/2006/customXml" ds:itemID="{D83787E9-855B-43BD-8382-B7C63B9BC33D}">
+  <ds:schemaRefs>
+    <ds:schemaRef ds:uri="http://schemas.microsoft.com/office/2006/metadata/properties"/>
+    <ds:schemaRef ds:uri="http://purl.org/dc/terms/"/>
+    <ds:schemaRef ds:uri="http://purl.org/dc/elements/1.1/"/>
+    <ds:schemaRef ds:uri="http://purl.org/dc/dcmitype/"/>
+    <ds:schemaRef ds:uri="http://schemas.microsoft.com/office/2006/documentManagement/types"/>
+    <ds:schemaRef ds:uri="http://schemas.openxmlformats.org/package/2006/metadata/core-properties"/>
+    <ds:schemaRef ds:uri="http://schemas.microsoft.com/office/infopath/2007/PartnerControls"/>
+    <ds:schemaRef ds:uri="http://schemas.microsoft.com/sharepoint/v3"/>
+    <ds:schemaRef ds:uri="http://www.w3.org/XML/1998/namespace"/>
+  </ds:schemaRefs>
+</ds:datastoreItem>
 </file>
</xml_diff>